<commit_message>
Added a new text box to the slide 1.
</commit_message>
<xml_diff>
--- a/Test-Presentation.pptx
+++ b/Test-Presentation.pptx
@@ -3208,6 +3208,39 @@
               <a:t> page</a:t>
             </a:r>
             <a:endParaRPr lang="en-US" dirty="0"/>
+          </a:p>
+        </p:txBody>
+      </p:sp>
+      <p:sp>
+        <p:nvSpPr>
+          <p:cNvPr id="3" name="TextBox 2"/>
+          <p:cNvSpPr txBox="1"/>
+          <p:nvPr/>
+        </p:nvSpPr>
+        <p:spPr>
+          <a:xfrm>
+            <a:off x="990600" y="3033962"/>
+            <a:ext cx="7391400" cy="369332"/>
+          </a:xfrm>
+          <a:prstGeom prst="rect">
+            <a:avLst/>
+          </a:prstGeom>
+          <a:noFill/>
+        </p:spPr>
+        <p:txBody>
+          <a:bodyPr wrap="square" rtlCol="0">
+            <a:spAutoFit/>
+          </a:bodyPr>
+          <a:lstStyle/>
+          <a:p>
+            <a:r>
+              <a:rPr lang="en-US" dirty="0" smtClean="0">
+                <a:solidFill>
+                  <a:srgbClr val="FF0000"/>
+                </a:solidFill>
+              </a:rPr>
+              <a:t>Added this Text Box in this slide.</a:t>
+            </a:r>
           </a:p>
         </p:txBody>
       </p:sp>

</xml_diff>

<commit_message>
Revert "Added a new text box to the slide 1."
This reverts commit b7bafa36e2b6bf5a7e57bf363c896aaa8a80ed76.
</commit_message>
<xml_diff>
--- a/Test-Presentation.pptx
+++ b/Test-Presentation.pptx
@@ -3208,39 +3208,6 @@
               <a:t> page</a:t>
             </a:r>
             <a:endParaRPr lang="en-US" dirty="0"/>
-          </a:p>
-        </p:txBody>
-      </p:sp>
-      <p:sp>
-        <p:nvSpPr>
-          <p:cNvPr id="3" name="TextBox 2"/>
-          <p:cNvSpPr txBox="1"/>
-          <p:nvPr/>
-        </p:nvSpPr>
-        <p:spPr>
-          <a:xfrm>
-            <a:off x="990600" y="3033962"/>
-            <a:ext cx="7391400" cy="369332"/>
-          </a:xfrm>
-          <a:prstGeom prst="rect">
-            <a:avLst/>
-          </a:prstGeom>
-          <a:noFill/>
-        </p:spPr>
-        <p:txBody>
-          <a:bodyPr wrap="square" rtlCol="0">
-            <a:spAutoFit/>
-          </a:bodyPr>
-          <a:lstStyle/>
-          <a:p>
-            <a:r>
-              <a:rPr lang="en-US" dirty="0" smtClean="0">
-                <a:solidFill>
-                  <a:srgbClr val="FF0000"/>
-                </a:solidFill>
-              </a:rPr>
-              <a:t>Added this Text Box in this slide.</a:t>
-            </a:r>
           </a:p>
         </p:txBody>
       </p:sp>

</xml_diff>